<commit_message>
added more commands to powerpoint
</commit_message>
<xml_diff>
--- a/Powerpoint/Baze de date biblioteca.pptx
+++ b/Powerpoint/Baze de date biblioteca.pptx
@@ -6,10 +6,10 @@
     <p:sldMasterId id="2147483660" r:id="rId2"/>
   </p:sldMasterIdLst>
   <p:notesMasterIdLst>
-    <p:notesMasterId r:id="rId16"/>
+    <p:notesMasterId r:id="rId18"/>
   </p:notesMasterIdLst>
   <p:handoutMasterIdLst>
-    <p:handoutMasterId r:id="rId17"/>
+    <p:handoutMasterId r:id="rId19"/>
   </p:handoutMasterIdLst>
   <p:sldIdLst>
     <p:sldId id="256" r:id="rId3"/>
@@ -24,7 +24,9 @@
     <p:sldId id="268" r:id="rId12"/>
     <p:sldId id="269" r:id="rId13"/>
     <p:sldId id="270" r:id="rId14"/>
-    <p:sldId id="266" r:id="rId15"/>
+    <p:sldId id="272" r:id="rId15"/>
+    <p:sldId id="271" r:id="rId16"/>
+    <p:sldId id="266" r:id="rId17"/>
   </p:sldIdLst>
   <p:sldSz cx="10080625" cy="5670550"/>
   <p:notesSz cx="7559675" cy="10691813"/>
@@ -7147,6 +7149,290 @@
 </file>
 
 <file path=ppt/slides/slide13.xml><?xml version="1.0" encoding="utf-8"?>
+<p:sld xmlns:a="http://schemas.openxmlformats.org/drawingml/2006/main" xmlns:r="http://schemas.openxmlformats.org/officeDocument/2006/relationships" xmlns:p="http://schemas.openxmlformats.org/presentationml/2006/main">
+  <p:cSld>
+    <p:spTree>
+      <p:nvGrpSpPr>
+        <p:cNvPr id="1" name=""/>
+        <p:cNvGrpSpPr/>
+        <p:nvPr/>
+      </p:nvGrpSpPr>
+      <p:grpSpPr>
+        <a:xfrm>
+          <a:off x="0" y="0"/>
+          <a:ext cx="0" cy="0"/>
+          <a:chOff x="0" y="0"/>
+          <a:chExt cx="0" cy="0"/>
+        </a:xfrm>
+      </p:grpSpPr>
+      <p:sp>
+        <p:nvSpPr>
+          <p:cNvPr id="2" name="Title 1">
+            <a:extLst>
+              <a:ext uri="{FF2B5EF4-FFF2-40B4-BE49-F238E27FC236}">
+                <a16:creationId xmlns:a16="http://schemas.microsoft.com/office/drawing/2014/main" id="{EDCBF574-E93C-4D58-8AFB-5D4D086719C1}"/>
+              </a:ext>
+            </a:extLst>
+          </p:cNvPr>
+          <p:cNvSpPr>
+            <a:spLocks noGrp="1"/>
+          </p:cNvSpPr>
+          <p:nvPr>
+            <p:ph type="title"/>
+          </p:nvPr>
+        </p:nvSpPr>
+        <p:spPr/>
+        <p:txBody>
+          <a:bodyPr/>
+          <a:lstStyle/>
+          <a:p>
+            <a:r>
+              <a:rPr lang="en-US" dirty="0"/>
+              <a:t>Reguli </a:t>
+            </a:r>
+            <a:r>
+              <a:rPr lang="en-US" dirty="0" err="1"/>
+              <a:t>procedurale</a:t>
+            </a:r>
+            <a:endParaRPr lang="en-US" dirty="0"/>
+          </a:p>
+        </p:txBody>
+      </p:sp>
+      <p:pic>
+        <p:nvPicPr>
+          <p:cNvPr id="5" name="Content Placeholder 4">
+            <a:extLst>
+              <a:ext uri="{FF2B5EF4-FFF2-40B4-BE49-F238E27FC236}">
+                <a16:creationId xmlns:a16="http://schemas.microsoft.com/office/drawing/2014/main" id="{20D7A79B-FC85-490B-9AB3-1BF9FFEBEE16}"/>
+              </a:ext>
+            </a:extLst>
+          </p:cNvPr>
+          <p:cNvPicPr>
+            <a:picLocks noGrp="1" noChangeAspect="1"/>
+          </p:cNvPicPr>
+          <p:nvPr>
+            <p:ph idx="1"/>
+          </p:nvPr>
+        </p:nvPicPr>
+        <p:blipFill>
+          <a:blip r:embed="rId2">
+            <a:extLst>
+              <a:ext uri="{28A0092B-C50C-407E-A947-70E740481C1C}">
+                <a14:useLocalDpi xmlns:a14="http://schemas.microsoft.com/office/drawing/2010/main" val="0"/>
+              </a:ext>
+            </a:extLst>
+          </a:blip>
+          <a:stretch>
+            <a:fillRect/>
+          </a:stretch>
+        </p:blipFill>
+        <p:spPr>
+          <a:xfrm>
+            <a:off x="698285" y="2221013"/>
+            <a:ext cx="4235050" cy="1207091"/>
+          </a:xfrm>
+        </p:spPr>
+      </p:pic>
+      <p:sp>
+        <p:nvSpPr>
+          <p:cNvPr id="6" name="TextBox 5">
+            <a:extLst>
+              <a:ext uri="{FF2B5EF4-FFF2-40B4-BE49-F238E27FC236}">
+                <a16:creationId xmlns:a16="http://schemas.microsoft.com/office/drawing/2014/main" id="{2B675A4B-8AED-4355-8991-490BB2F4F5DE}"/>
+              </a:ext>
+            </a:extLst>
+          </p:cNvPr>
+          <p:cNvSpPr txBox="1"/>
+          <p:nvPr/>
+        </p:nvSpPr>
+        <p:spPr>
+          <a:xfrm>
+            <a:off x="7101348" y="2455226"/>
+            <a:ext cx="1614949" cy="369332"/>
+          </a:xfrm>
+          <a:prstGeom prst="rect">
+            <a:avLst/>
+          </a:prstGeom>
+          <a:noFill/>
+        </p:spPr>
+        <p:txBody>
+          <a:bodyPr wrap="square" rtlCol="0">
+            <a:spAutoFit/>
+          </a:bodyPr>
+          <a:lstStyle/>
+          <a:p>
+            <a:r>
+              <a:rPr lang="en-US" dirty="0" err="1"/>
+              <a:t>Tabela</a:t>
+            </a:r>
+            <a:r>
+              <a:rPr lang="en-US" dirty="0"/>
+              <a:t> </a:t>
+            </a:r>
+            <a:r>
+              <a:rPr lang="en-US" dirty="0" err="1"/>
+              <a:t>genuri</a:t>
+            </a:r>
+            <a:endParaRPr lang="en-US" dirty="0"/>
+          </a:p>
+        </p:txBody>
+      </p:sp>
+    </p:spTree>
+    <p:extLst>
+      <p:ext uri="{BB962C8B-B14F-4D97-AF65-F5344CB8AC3E}">
+        <p14:creationId xmlns:p14="http://schemas.microsoft.com/office/powerpoint/2010/main" val="2644177150"/>
+      </p:ext>
+    </p:extLst>
+  </p:cSld>
+  <p:clrMapOvr>
+    <a:masterClrMapping/>
+  </p:clrMapOvr>
+</p:sld>
+</file>
+
+<file path=ppt/slides/slide14.xml><?xml version="1.0" encoding="utf-8"?>
+<p:sld xmlns:a="http://schemas.openxmlformats.org/drawingml/2006/main" xmlns:r="http://schemas.openxmlformats.org/officeDocument/2006/relationships" xmlns:p="http://schemas.openxmlformats.org/presentationml/2006/main">
+  <p:cSld>
+    <p:spTree>
+      <p:nvGrpSpPr>
+        <p:cNvPr id="1" name=""/>
+        <p:cNvGrpSpPr/>
+        <p:nvPr/>
+      </p:nvGrpSpPr>
+      <p:grpSpPr>
+        <a:xfrm>
+          <a:off x="0" y="0"/>
+          <a:ext cx="0" cy="0"/>
+          <a:chOff x="0" y="0"/>
+          <a:chExt cx="0" cy="0"/>
+        </a:xfrm>
+      </p:grpSpPr>
+      <p:sp>
+        <p:nvSpPr>
+          <p:cNvPr id="2" name="Title 1">
+            <a:extLst>
+              <a:ext uri="{FF2B5EF4-FFF2-40B4-BE49-F238E27FC236}">
+                <a16:creationId xmlns:a16="http://schemas.microsoft.com/office/drawing/2014/main" id="{4A8B4E8D-A04D-4157-B6AA-E3E0714BB6E5}"/>
+              </a:ext>
+            </a:extLst>
+          </p:cNvPr>
+          <p:cNvSpPr>
+            <a:spLocks noGrp="1"/>
+          </p:cNvSpPr>
+          <p:nvPr>
+            <p:ph type="title"/>
+          </p:nvPr>
+        </p:nvSpPr>
+        <p:spPr/>
+        <p:txBody>
+          <a:bodyPr/>
+          <a:lstStyle/>
+          <a:p>
+            <a:r>
+              <a:rPr lang="en-US" dirty="0"/>
+              <a:t>Reguli </a:t>
+            </a:r>
+            <a:r>
+              <a:rPr lang="en-US" dirty="0" err="1"/>
+              <a:t>procedurale</a:t>
+            </a:r>
+            <a:endParaRPr lang="en-US" dirty="0"/>
+          </a:p>
+        </p:txBody>
+      </p:sp>
+      <p:pic>
+        <p:nvPicPr>
+          <p:cNvPr id="5" name="Content Placeholder 4">
+            <a:extLst>
+              <a:ext uri="{FF2B5EF4-FFF2-40B4-BE49-F238E27FC236}">
+                <a16:creationId xmlns:a16="http://schemas.microsoft.com/office/drawing/2014/main" id="{554C6ED6-16DD-482E-A6E7-CD0F0530EBF3}"/>
+              </a:ext>
+            </a:extLst>
+          </p:cNvPr>
+          <p:cNvPicPr>
+            <a:picLocks noGrp="1" noChangeAspect="1"/>
+          </p:cNvPicPr>
+          <p:nvPr>
+            <p:ph idx="1"/>
+          </p:nvPr>
+        </p:nvPicPr>
+        <p:blipFill>
+          <a:blip r:embed="rId2">
+            <a:extLst>
+              <a:ext uri="{28A0092B-C50C-407E-A947-70E740481C1C}">
+                <a14:useLocalDpi xmlns:a14="http://schemas.microsoft.com/office/drawing/2010/main" val="0"/>
+              </a:ext>
+            </a:extLst>
+          </a:blip>
+          <a:stretch>
+            <a:fillRect/>
+          </a:stretch>
+        </p:blipFill>
+        <p:spPr>
+          <a:xfrm>
+            <a:off x="399994" y="1909916"/>
+            <a:ext cx="4194380" cy="2499851"/>
+          </a:xfrm>
+        </p:spPr>
+      </p:pic>
+      <p:sp>
+        <p:nvSpPr>
+          <p:cNvPr id="6" name="TextBox 5">
+            <a:extLst>
+              <a:ext uri="{FF2B5EF4-FFF2-40B4-BE49-F238E27FC236}">
+                <a16:creationId xmlns:a16="http://schemas.microsoft.com/office/drawing/2014/main" id="{334471F0-BF87-420A-B560-630392A2F886}"/>
+              </a:ext>
+            </a:extLst>
+          </p:cNvPr>
+          <p:cNvSpPr txBox="1"/>
+          <p:nvPr/>
+        </p:nvSpPr>
+        <p:spPr>
+          <a:xfrm>
+            <a:off x="6813755" y="2381865"/>
+            <a:ext cx="2005780" cy="369332"/>
+          </a:xfrm>
+          <a:prstGeom prst="rect">
+            <a:avLst/>
+          </a:prstGeom>
+          <a:noFill/>
+        </p:spPr>
+        <p:txBody>
+          <a:bodyPr wrap="square" rtlCol="0">
+            <a:spAutoFit/>
+          </a:bodyPr>
+          <a:lstStyle/>
+          <a:p>
+            <a:r>
+              <a:rPr lang="en-US" dirty="0" err="1"/>
+              <a:t>Inserarea</a:t>
+            </a:r>
+            <a:r>
+              <a:rPr lang="en-US" dirty="0"/>
+              <a:t> </a:t>
+            </a:r>
+            <a:r>
+              <a:rPr lang="en-US" dirty="0" err="1"/>
+              <a:t>genurilor</a:t>
+            </a:r>
+            <a:endParaRPr lang="en-US" dirty="0"/>
+          </a:p>
+        </p:txBody>
+      </p:sp>
+    </p:spTree>
+    <p:extLst>
+      <p:ext uri="{BB962C8B-B14F-4D97-AF65-F5344CB8AC3E}">
+        <p14:creationId xmlns:p14="http://schemas.microsoft.com/office/powerpoint/2010/main" val="3668250404"/>
+      </p:ext>
+    </p:extLst>
+  </p:cSld>
+  <p:clrMapOvr>
+    <a:masterClrMapping/>
+  </p:clrMapOvr>
+</p:sld>
+</file>
+
+<file path=ppt/slides/slide15.xml><?xml version="1.0" encoding="utf-8"?>
 <p:sld xmlns:a="http://schemas.openxmlformats.org/drawingml/2006/main" xmlns:r="http://schemas.openxmlformats.org/officeDocument/2006/relationships" xmlns:p="http://schemas.openxmlformats.org/presentationml/2006/main">
   <p:cSld>
     <p:spTree>

</xml_diff>